<commit_message>
Edits based on Feedback from Presentation to Class
</commit_message>
<xml_diff>
--- a/Project_One_Starbucks_Analysis.pptx
+++ b/Project_One_Starbucks_Analysis.pptx
@@ -5,7 +5,7 @@
     <p:sldMasterId id="2147483648" r:id="rId1"/>
   </p:sldMasterIdLst>
   <p:notesMasterIdLst>
-    <p:notesMasterId r:id="rId10"/>
+    <p:notesMasterId r:id="rId13"/>
   </p:notesMasterIdLst>
   <p:sldIdLst>
     <p:sldId id="270" r:id="rId2"/>
@@ -16,6 +16,9 @@
     <p:sldId id="329" r:id="rId7"/>
     <p:sldId id="330" r:id="rId8"/>
     <p:sldId id="331" r:id="rId9"/>
+    <p:sldId id="332" r:id="rId10"/>
+    <p:sldId id="333" r:id="rId11"/>
+    <p:sldId id="334" r:id="rId12"/>
   </p:sldIdLst>
   <p:sldSz cx="9144000" cy="5143500" type="screen16x9"/>
   <p:notesSz cx="6858000" cy="9144000"/>
@@ -215,7 +218,7 @@
           <a:p>
             <a:fld id="{8E622622-0D21-485C-AA80-DDAF7F1863E6}" type="datetimeFigureOut">
               <a:rPr lang="en-US" smtClean="0"/>
-              <a:t>2/7/22</a:t>
+              <a:t>2/11/22</a:t>
             </a:fld>
             <a:endParaRPr lang="en-US"/>
           </a:p>
@@ -658,7 +661,7 @@
           <a:p>
             <a:fld id="{98FEAEE1-41C1-4806-A95A-94B133B5FAE5}" type="datetimeFigureOut">
               <a:rPr lang="en-US" smtClean="0"/>
-              <a:t>2/7/22</a:t>
+              <a:t>2/11/22</a:t>
             </a:fld>
             <a:endParaRPr lang="en-US"/>
           </a:p>
@@ -867,7 +870,7 @@
           <a:p>
             <a:fld id="{98FEAEE1-41C1-4806-A95A-94B133B5FAE5}" type="datetimeFigureOut">
               <a:rPr lang="en-US" smtClean="0"/>
-              <a:t>2/7/22</a:t>
+              <a:t>2/11/22</a:t>
             </a:fld>
             <a:endParaRPr lang="en-US"/>
           </a:p>
@@ -1040,7 +1043,7 @@
           <a:p>
             <a:fld id="{98FEAEE1-41C1-4806-A95A-94B133B5FAE5}" type="datetimeFigureOut">
               <a:rPr lang="en-US" smtClean="0"/>
-              <a:t>2/7/22</a:t>
+              <a:t>2/11/22</a:t>
             </a:fld>
             <a:endParaRPr lang="en-US"/>
           </a:p>
@@ -1265,7 +1268,7 @@
           <a:p>
             <a:fld id="{98FEAEE1-41C1-4806-A95A-94B133B5FAE5}" type="datetimeFigureOut">
               <a:rPr lang="en-US" smtClean="0"/>
-              <a:t>2/7/22</a:t>
+              <a:t>2/11/22</a:t>
             </a:fld>
             <a:endParaRPr lang="en-US"/>
           </a:p>
@@ -1762,7 +1765,7 @@
           <a:p>
             <a:fld id="{98FEAEE1-41C1-4806-A95A-94B133B5FAE5}" type="datetimeFigureOut">
               <a:rPr lang="en-US" smtClean="0"/>
-              <a:t>2/7/22</a:t>
+              <a:t>2/11/22</a:t>
             </a:fld>
             <a:endParaRPr lang="en-US"/>
           </a:p>
@@ -2181,7 +2184,7 @@
           <a:p>
             <a:fld id="{98FEAEE1-41C1-4806-A95A-94B133B5FAE5}" type="datetimeFigureOut">
               <a:rPr lang="en-US" smtClean="0"/>
-              <a:t>2/7/22</a:t>
+              <a:t>2/11/22</a:t>
             </a:fld>
             <a:endParaRPr lang="en-US"/>
           </a:p>
@@ -2293,7 +2296,7 @@
           <a:p>
             <a:fld id="{98FEAEE1-41C1-4806-A95A-94B133B5FAE5}" type="datetimeFigureOut">
               <a:rPr lang="en-US" smtClean="0"/>
-              <a:t>2/7/22</a:t>
+              <a:t>2/11/22</a:t>
             </a:fld>
             <a:endParaRPr lang="en-US"/>
           </a:p>
@@ -2383,7 +2386,7 @@
           <a:p>
             <a:fld id="{98FEAEE1-41C1-4806-A95A-94B133B5FAE5}" type="datetimeFigureOut">
               <a:rPr lang="en-US" smtClean="0"/>
-              <a:t>2/7/22</a:t>
+              <a:t>2/11/22</a:t>
             </a:fld>
             <a:endParaRPr lang="en-US"/>
           </a:p>
@@ -2653,7 +2656,7 @@
           <a:p>
             <a:fld id="{98FEAEE1-41C1-4806-A95A-94B133B5FAE5}" type="datetimeFigureOut">
               <a:rPr lang="en-US" smtClean="0"/>
-              <a:t>2/7/22</a:t>
+              <a:t>2/11/22</a:t>
             </a:fld>
             <a:endParaRPr lang="en-US"/>
           </a:p>
@@ -2900,7 +2903,7 @@
           <a:p>
             <a:fld id="{98FEAEE1-41C1-4806-A95A-94B133B5FAE5}" type="datetimeFigureOut">
               <a:rPr lang="en-US" smtClean="0"/>
-              <a:t>2/7/22</a:t>
+              <a:t>2/11/22</a:t>
             </a:fld>
             <a:endParaRPr lang="en-US"/>
           </a:p>
@@ -3106,7 +3109,7 @@
           <a:p>
             <a:fld id="{98FEAEE1-41C1-4806-A95A-94B133B5FAE5}" type="datetimeFigureOut">
               <a:rPr lang="en-US" smtClean="0"/>
-              <a:t>2/7/22</a:t>
+              <a:t>2/11/22</a:t>
             </a:fld>
             <a:endParaRPr lang="en-US"/>
           </a:p>
@@ -3796,6 +3799,321 @@
 </p:sld>
 </file>
 
+<file path=ppt/slides/slide10.xml><?xml version="1.0" encoding="utf-8"?>
+<p:sld xmlns:a="http://schemas.openxmlformats.org/drawingml/2006/main" xmlns:r="http://schemas.openxmlformats.org/officeDocument/2006/relationships" xmlns:p="http://schemas.openxmlformats.org/presentationml/2006/main">
+  <p:cSld>
+    <p:spTree>
+      <p:nvGrpSpPr>
+        <p:cNvPr id="1" name=""/>
+        <p:cNvGrpSpPr/>
+        <p:nvPr/>
+      </p:nvGrpSpPr>
+      <p:grpSpPr>
+        <a:xfrm>
+          <a:off x="0" y="0"/>
+          <a:ext cx="0" cy="0"/>
+          <a:chOff x="0" y="0"/>
+          <a:chExt cx="0" cy="0"/>
+        </a:xfrm>
+      </p:grpSpPr>
+      <p:sp>
+        <p:nvSpPr>
+          <p:cNvPr id="4" name="TextBox 3">
+            <a:extLst>
+              <a:ext uri="{FF2B5EF4-FFF2-40B4-BE49-F238E27FC236}">
+                <a16:creationId xmlns:a16="http://schemas.microsoft.com/office/drawing/2014/main" id="{B411CEFA-0371-944F-9C64-6AD9B0F070E7}"/>
+              </a:ext>
+            </a:extLst>
+          </p:cNvPr>
+          <p:cNvSpPr txBox="1"/>
+          <p:nvPr/>
+        </p:nvSpPr>
+        <p:spPr>
+          <a:xfrm>
+            <a:off x="-315883" y="199072"/>
+            <a:ext cx="9144000" cy="461665"/>
+          </a:xfrm>
+          <a:prstGeom prst="rect">
+            <a:avLst/>
+          </a:prstGeom>
+          <a:noFill/>
+        </p:spPr>
+        <p:txBody>
+          <a:bodyPr wrap="square" rtlCol="0">
+            <a:spAutoFit/>
+          </a:bodyPr>
+          <a:lstStyle/>
+          <a:p>
+            <a:pPr algn="ctr"/>
+            <a:r>
+              <a:rPr lang="en-US" sz="2400" dirty="0">
+                <a:solidFill>
+                  <a:schemeClr val="bg1"/>
+                </a:solidFill>
+              </a:rPr>
+              <a:t>Top 125 US Expansion City Candidates – Scatter Plot</a:t>
+            </a:r>
+          </a:p>
+        </p:txBody>
+      </p:sp>
+      <p:pic>
+        <p:nvPicPr>
+          <p:cNvPr id="5" name="Picture 4">
+            <a:extLst>
+              <a:ext uri="{FF2B5EF4-FFF2-40B4-BE49-F238E27FC236}">
+                <a16:creationId xmlns:a16="http://schemas.microsoft.com/office/drawing/2014/main" id="{5C4B3DE2-E325-8D49-8C31-FACEB29EAFF5}"/>
+              </a:ext>
+            </a:extLst>
+          </p:cNvPr>
+          <p:cNvPicPr>
+            <a:picLocks noChangeAspect="1"/>
+          </p:cNvPicPr>
+          <p:nvPr/>
+        </p:nvPicPr>
+        <p:blipFill>
+          <a:blip r:embed="rId2"/>
+          <a:stretch>
+            <a:fillRect/>
+          </a:stretch>
+        </p:blipFill>
+        <p:spPr>
+          <a:xfrm>
+            <a:off x="743561" y="664769"/>
+            <a:ext cx="7386286" cy="4120819"/>
+          </a:xfrm>
+          <a:prstGeom prst="rect">
+            <a:avLst/>
+          </a:prstGeom>
+        </p:spPr>
+      </p:pic>
+    </p:spTree>
+    <p:extLst>
+      <p:ext uri="{BB962C8B-B14F-4D97-AF65-F5344CB8AC3E}">
+        <p14:creationId xmlns:p14="http://schemas.microsoft.com/office/powerpoint/2010/main" val="4249344035"/>
+      </p:ext>
+    </p:extLst>
+  </p:cSld>
+  <p:clrMapOvr>
+    <a:masterClrMapping/>
+  </p:clrMapOvr>
+</p:sld>
+</file>
+
+<file path=ppt/slides/slide11.xml><?xml version="1.0" encoding="utf-8"?>
+<p:sld xmlns:a="http://schemas.openxmlformats.org/drawingml/2006/main" xmlns:r="http://schemas.openxmlformats.org/officeDocument/2006/relationships" xmlns:p="http://schemas.openxmlformats.org/presentationml/2006/main">
+  <p:cSld>
+    <p:spTree>
+      <p:nvGrpSpPr>
+        <p:cNvPr id="1" name=""/>
+        <p:cNvGrpSpPr/>
+        <p:nvPr/>
+      </p:nvGrpSpPr>
+      <p:grpSpPr>
+        <a:xfrm>
+          <a:off x="0" y="0"/>
+          <a:ext cx="0" cy="0"/>
+          <a:chOff x="0" y="0"/>
+          <a:chExt cx="0" cy="0"/>
+        </a:xfrm>
+      </p:grpSpPr>
+      <p:sp>
+        <p:nvSpPr>
+          <p:cNvPr id="2" name="Title 1"/>
+          <p:cNvSpPr>
+            <a:spLocks noGrp="1"/>
+          </p:cNvSpPr>
+          <p:nvPr>
+            <p:ph type="title"/>
+          </p:nvPr>
+        </p:nvSpPr>
+        <p:spPr/>
+        <p:txBody>
+          <a:bodyPr/>
+          <a:lstStyle/>
+          <a:p>
+            <a:r>
+              <a:rPr lang="en-US" dirty="0"/>
+              <a:t>Project One: Conclusions</a:t>
+            </a:r>
+          </a:p>
+        </p:txBody>
+      </p:sp>
+      <p:sp>
+        <p:nvSpPr>
+          <p:cNvPr id="4" name="TextBox 3">
+            <a:extLst>
+              <a:ext uri="{FF2B5EF4-FFF2-40B4-BE49-F238E27FC236}">
+                <a16:creationId xmlns:a16="http://schemas.microsoft.com/office/drawing/2014/main" id="{B696550C-8F67-5640-8D11-61495A794760}"/>
+              </a:ext>
+            </a:extLst>
+          </p:cNvPr>
+          <p:cNvSpPr txBox="1"/>
+          <p:nvPr/>
+        </p:nvSpPr>
+        <p:spPr>
+          <a:xfrm>
+            <a:off x="902208" y="819150"/>
+            <a:ext cx="6620256" cy="3770263"/>
+          </a:xfrm>
+          <a:prstGeom prst="rect">
+            <a:avLst/>
+          </a:prstGeom>
+          <a:noFill/>
+          <a:ln w="28575">
+            <a:solidFill>
+              <a:schemeClr val="tx2"/>
+            </a:solidFill>
+          </a:ln>
+        </p:spPr>
+        <p:txBody>
+          <a:bodyPr wrap="square" rtlCol="0">
+            <a:spAutoFit/>
+          </a:bodyPr>
+          <a:lstStyle/>
+          <a:p>
+            <a:pPr marL="285750" indent="-285750">
+              <a:buFont typeface="Wingdings" pitchFamily="2" charset="2"/>
+              <a:buChar char="Ø"/>
+            </a:pPr>
+            <a:r>
+              <a:rPr lang="en-US" sz="1300" dirty="0"/>
+              <a:t>Is there a correlation between the total number of stores within a city and the city's annual average income?</a:t>
+            </a:r>
+          </a:p>
+          <a:p>
+            <a:pPr marL="742950" lvl="1" indent="-285750">
+              <a:buFont typeface="Wingdings" pitchFamily="2" charset="2"/>
+              <a:buChar char="ü"/>
+            </a:pPr>
+            <a:r>
+              <a:rPr lang="en-US" sz="1300" dirty="0"/>
+              <a:t>We did not see much, if any, </a:t>
+            </a:r>
+            <a:r>
+              <a:rPr lang="en-US" sz="1300" dirty="0" err="1"/>
+              <a:t>coorelation</a:t>
+            </a:r>
+            <a:r>
+              <a:rPr lang="en-US" sz="1300" dirty="0"/>
+              <a:t> between the number of coffee stores in a given city and the average annual income of that city. The scatter plot shows a similar view at income averages at $45,000/annually as to a city with an average income of $100,000/annually or higher.</a:t>
+            </a:r>
+          </a:p>
+          <a:p>
+            <a:pPr marL="285750" indent="-285750">
+              <a:buFont typeface="Wingdings" pitchFamily="2" charset="2"/>
+              <a:buChar char="Ø"/>
+            </a:pPr>
+            <a:r>
+              <a:rPr lang="en-US" sz="1300" dirty="0"/>
+              <a:t>Is there a correlation between the total number of stores within a city and the city's population?</a:t>
+            </a:r>
+          </a:p>
+          <a:p>
+            <a:pPr marL="742950" lvl="1" indent="-285750">
+              <a:buFont typeface="Wingdings" pitchFamily="2" charset="2"/>
+              <a:buChar char="ü"/>
+            </a:pPr>
+            <a:r>
+              <a:rPr lang="en-US" sz="1300" dirty="0"/>
+              <a:t>We can see </a:t>
+            </a:r>
+            <a:r>
+              <a:rPr lang="en-US" sz="1300" dirty="0" err="1"/>
+              <a:t>coorelation</a:t>
+            </a:r>
+            <a:r>
+              <a:rPr lang="en-US" sz="1300" dirty="0"/>
+              <a:t> in the number of stores </a:t>
+            </a:r>
+            <a:r>
+              <a:rPr lang="en-US" sz="1300" dirty="0" err="1"/>
+              <a:t>witin</a:t>
+            </a:r>
+            <a:r>
+              <a:rPr lang="en-US" sz="1300" dirty="0"/>
+              <a:t> a given city and the population of that city. The scatter plot shows a linear upward trend as population increases, the number of stores increases. This can also be seen from the analysis around the average population count for one store. It is very </a:t>
+            </a:r>
+            <a:r>
+              <a:rPr lang="en-US" sz="1300" dirty="0" err="1"/>
+              <a:t>consistant</a:t>
+            </a:r>
+            <a:r>
+              <a:rPr lang="en-US" sz="1300" dirty="0"/>
+              <a:t> for most areas.</a:t>
+            </a:r>
+          </a:p>
+          <a:p>
+            <a:pPr marL="285750" indent="-285750">
+              <a:buFont typeface="Wingdings" pitchFamily="2" charset="2"/>
+              <a:buChar char="Ø"/>
+            </a:pPr>
+            <a:r>
+              <a:rPr lang="en-US" sz="1300" dirty="0"/>
+              <a:t>Are there underserved or overserved cities based on standard deviation from a mean?</a:t>
+            </a:r>
+          </a:p>
+          <a:p>
+            <a:pPr marL="742950" lvl="1" indent="-285750">
+              <a:buFont typeface="Wingdings" pitchFamily="2" charset="2"/>
+              <a:buChar char="ü"/>
+            </a:pPr>
+            <a:r>
+              <a:rPr lang="en-US" sz="1300" dirty="0"/>
+              <a:t>We can derive a list of good candidate cities to look at for expansion based on those cities that had population averages, per a single coffee shop, well above one standard deviation. We found about 125 cities to investigate and determine if additional stores could be opened.</a:t>
+            </a:r>
+          </a:p>
+          <a:p>
+            <a:endParaRPr lang="en-US" dirty="0"/>
+          </a:p>
+        </p:txBody>
+      </p:sp>
+      <p:sp>
+        <p:nvSpPr>
+          <p:cNvPr id="10" name="TextBox 9">
+            <a:extLst>
+              <a:ext uri="{FF2B5EF4-FFF2-40B4-BE49-F238E27FC236}">
+                <a16:creationId xmlns:a16="http://schemas.microsoft.com/office/drawing/2014/main" id="{B3DA859A-51C5-984B-9509-12993C546B28}"/>
+              </a:ext>
+            </a:extLst>
+          </p:cNvPr>
+          <p:cNvSpPr txBox="1"/>
+          <p:nvPr/>
+        </p:nvSpPr>
+        <p:spPr>
+          <a:xfrm>
+            <a:off x="54864" y="4814410"/>
+            <a:ext cx="9144000" cy="369332"/>
+          </a:xfrm>
+          <a:prstGeom prst="rect">
+            <a:avLst/>
+          </a:prstGeom>
+          <a:solidFill>
+            <a:schemeClr val="tx2"/>
+          </a:solidFill>
+        </p:spPr>
+        <p:txBody>
+          <a:bodyPr wrap="square" rtlCol="0">
+            <a:spAutoFit/>
+          </a:bodyPr>
+          <a:lstStyle/>
+          <a:p>
+            <a:endParaRPr lang="en-US" dirty="0"/>
+          </a:p>
+        </p:txBody>
+      </p:sp>
+    </p:spTree>
+    <p:extLst>
+      <p:ext uri="{BB962C8B-B14F-4D97-AF65-F5344CB8AC3E}">
+        <p14:creationId xmlns:p14="http://schemas.microsoft.com/office/powerpoint/2010/main" val="2559943593"/>
+      </p:ext>
+    </p:extLst>
+  </p:cSld>
+  <p:clrMapOvr>
+    <a:masterClrMapping/>
+  </p:clrMapOvr>
+</p:sld>
+</file>
+
 <file path=ppt/slides/slide2.xml><?xml version="1.0" encoding="utf-8"?>
 <p:sld xmlns:a="http://schemas.openxmlformats.org/drawingml/2006/main" xmlns:r="http://schemas.openxmlformats.org/officeDocument/2006/relationships" xmlns:p="http://schemas.openxmlformats.org/presentationml/2006/main">
   <p:cSld>
@@ -5416,7 +5734,7 @@
         <p:spPr>
           <a:xfrm>
             <a:off x="150311" y="150312"/>
-            <a:ext cx="8818323" cy="461665"/>
+            <a:ext cx="8818323" cy="400110"/>
           </a:xfrm>
           <a:prstGeom prst="rect">
             <a:avLst/>
@@ -5430,12 +5748,12 @@
           <a:lstStyle/>
           <a:p>
             <a:r>
-              <a:rPr lang="en-US" sz="2400" dirty="0">
+              <a:rPr lang="en-US" sz="2000" dirty="0">
                 <a:solidFill>
                   <a:schemeClr val="bg1"/>
                 </a:solidFill>
               </a:rPr>
-              <a:t>Correlation between Population / Average Income and Store Counts </a:t>
+              <a:t>Standard Deviation between Population and Store Counts </a:t>
             </a:r>
           </a:p>
         </p:txBody>
@@ -5474,6 +5792,251 @@
     <p:extLst>
       <p:ext uri="{BB962C8B-B14F-4D97-AF65-F5344CB8AC3E}">
         <p14:creationId xmlns:p14="http://schemas.microsoft.com/office/powerpoint/2010/main" val="2644224465"/>
+      </p:ext>
+    </p:extLst>
+  </p:cSld>
+  <p:clrMapOvr>
+    <a:masterClrMapping/>
+  </p:clrMapOvr>
+</p:sld>
+</file>
+
+<file path=ppt/slides/slide9.xml><?xml version="1.0" encoding="utf-8"?>
+<p:sld xmlns:a="http://schemas.openxmlformats.org/drawingml/2006/main" xmlns:r="http://schemas.openxmlformats.org/officeDocument/2006/relationships" xmlns:p="http://schemas.openxmlformats.org/presentationml/2006/main">
+  <p:cSld>
+    <p:spTree>
+      <p:nvGrpSpPr>
+        <p:cNvPr id="1" name=""/>
+        <p:cNvGrpSpPr/>
+        <p:nvPr/>
+      </p:nvGrpSpPr>
+      <p:grpSpPr>
+        <a:xfrm>
+          <a:off x="0" y="0"/>
+          <a:ext cx="0" cy="0"/>
+          <a:chOff x="0" y="0"/>
+          <a:chExt cx="0" cy="0"/>
+        </a:xfrm>
+      </p:grpSpPr>
+      <p:sp>
+        <p:nvSpPr>
+          <p:cNvPr id="2" name="TextBox 1">
+            <a:extLst>
+              <a:ext uri="{FF2B5EF4-FFF2-40B4-BE49-F238E27FC236}">
+                <a16:creationId xmlns:a16="http://schemas.microsoft.com/office/drawing/2014/main" id="{C0D43654-3BE1-B549-B4FB-D119A3CA6DBB}"/>
+              </a:ext>
+            </a:extLst>
+          </p:cNvPr>
+          <p:cNvSpPr txBox="1"/>
+          <p:nvPr/>
+        </p:nvSpPr>
+        <p:spPr>
+          <a:xfrm>
+            <a:off x="150311" y="150312"/>
+            <a:ext cx="8818323" cy="461665"/>
+          </a:xfrm>
+          <a:prstGeom prst="rect">
+            <a:avLst/>
+          </a:prstGeom>
+          <a:noFill/>
+        </p:spPr>
+        <p:txBody>
+          <a:bodyPr wrap="square" rtlCol="0">
+            <a:spAutoFit/>
+          </a:bodyPr>
+          <a:lstStyle/>
+          <a:p>
+            <a:pPr algn="ctr"/>
+            <a:r>
+              <a:rPr lang="en-US" sz="2400" dirty="0">
+                <a:solidFill>
+                  <a:schemeClr val="bg1"/>
+                </a:solidFill>
+              </a:rPr>
+              <a:t>Average Store Count per City Population</a:t>
+            </a:r>
+          </a:p>
+        </p:txBody>
+      </p:sp>
+      <p:pic>
+        <p:nvPicPr>
+          <p:cNvPr id="4" name="Picture 3">
+            <a:extLst>
+              <a:ext uri="{FF2B5EF4-FFF2-40B4-BE49-F238E27FC236}">
+                <a16:creationId xmlns:a16="http://schemas.microsoft.com/office/drawing/2014/main" id="{7A1C3212-2420-4F46-94AA-129D4BBAB0D5}"/>
+              </a:ext>
+            </a:extLst>
+          </p:cNvPr>
+          <p:cNvPicPr>
+            <a:picLocks noChangeAspect="1"/>
+          </p:cNvPicPr>
+          <p:nvPr/>
+        </p:nvPicPr>
+        <p:blipFill>
+          <a:blip r:embed="rId2"/>
+          <a:stretch>
+            <a:fillRect/>
+          </a:stretch>
+        </p:blipFill>
+        <p:spPr>
+          <a:xfrm>
+            <a:off x="860996" y="2265094"/>
+            <a:ext cx="7119222" cy="2728094"/>
+          </a:xfrm>
+          <a:prstGeom prst="rect">
+            <a:avLst/>
+          </a:prstGeom>
+        </p:spPr>
+      </p:pic>
+      <p:sp>
+        <p:nvSpPr>
+          <p:cNvPr id="5" name="TextBox 4">
+            <a:extLst>
+              <a:ext uri="{FF2B5EF4-FFF2-40B4-BE49-F238E27FC236}">
+                <a16:creationId xmlns:a16="http://schemas.microsoft.com/office/drawing/2014/main" id="{32BB1AB2-4B3D-3842-B69E-4A3ED530862E}"/>
+              </a:ext>
+            </a:extLst>
+          </p:cNvPr>
+          <p:cNvSpPr txBox="1"/>
+          <p:nvPr/>
+        </p:nvSpPr>
+        <p:spPr>
+          <a:xfrm>
+            <a:off x="1" y="1745240"/>
+            <a:ext cx="9144000" cy="461665"/>
+          </a:xfrm>
+          <a:prstGeom prst="rect">
+            <a:avLst/>
+          </a:prstGeom>
+          <a:noFill/>
+        </p:spPr>
+        <p:txBody>
+          <a:bodyPr wrap="square" rtlCol="0">
+            <a:spAutoFit/>
+          </a:bodyPr>
+          <a:lstStyle/>
+          <a:p>
+            <a:pPr algn="ctr"/>
+            <a:r>
+              <a:rPr lang="en-US" sz="2400" dirty="0">
+                <a:solidFill>
+                  <a:schemeClr val="bg1"/>
+                </a:solidFill>
+              </a:rPr>
+              <a:t>Top 125 US Expansion City Candidates – </a:t>
+            </a:r>
+            <a:r>
+              <a:rPr lang="en-US" sz="2400" dirty="0" err="1">
+                <a:solidFill>
+                  <a:schemeClr val="bg1"/>
+                </a:solidFill>
+              </a:rPr>
+              <a:t>DataFrame</a:t>
+            </a:r>
+            <a:r>
+              <a:rPr lang="en-US" sz="2400" dirty="0">
+                <a:solidFill>
+                  <a:schemeClr val="bg1"/>
+                </a:solidFill>
+              </a:rPr>
+              <a:t> Format</a:t>
+            </a:r>
+          </a:p>
+        </p:txBody>
+      </p:sp>
+      <p:sp>
+        <p:nvSpPr>
+          <p:cNvPr id="6" name="Rectangle 5">
+            <a:extLst>
+              <a:ext uri="{FF2B5EF4-FFF2-40B4-BE49-F238E27FC236}">
+                <a16:creationId xmlns:a16="http://schemas.microsoft.com/office/drawing/2014/main" id="{59EADE39-CD06-EA42-950D-353B9B757DA6}"/>
+              </a:ext>
+            </a:extLst>
+          </p:cNvPr>
+          <p:cNvSpPr/>
+          <p:nvPr/>
+        </p:nvSpPr>
+        <p:spPr>
+          <a:xfrm>
+            <a:off x="829509" y="642063"/>
+            <a:ext cx="7182196" cy="954107"/>
+          </a:xfrm>
+          <a:prstGeom prst="rect">
+            <a:avLst/>
+          </a:prstGeom>
+          <a:ln w="28575">
+            <a:solidFill>
+              <a:schemeClr val="bg1"/>
+            </a:solidFill>
+          </a:ln>
+        </p:spPr>
+        <p:txBody>
+          <a:bodyPr wrap="square">
+            <a:spAutoFit/>
+          </a:bodyPr>
+          <a:lstStyle/>
+          <a:p>
+            <a:pPr marL="285750" indent="-285750">
+              <a:buFont typeface="Wingdings" pitchFamily="2" charset="2"/>
+              <a:buChar char="Ø"/>
+            </a:pPr>
+            <a:r>
+              <a:rPr lang="en-US" sz="1400" dirty="0">
+                <a:solidFill>
+                  <a:schemeClr val="bg1"/>
+                </a:solidFill>
+              </a:rPr>
+              <a:t>The Max number of stores per population = 153,703.0 </a:t>
+            </a:r>
+          </a:p>
+          <a:p>
+            <a:pPr marL="285750" indent="-285750">
+              <a:buFont typeface="Wingdings" pitchFamily="2" charset="2"/>
+              <a:buChar char="Ø"/>
+            </a:pPr>
+            <a:r>
+              <a:rPr lang="en-US" sz="1400" dirty="0">
+                <a:solidFill>
+                  <a:schemeClr val="bg1"/>
+                </a:solidFill>
+              </a:rPr>
+              <a:t>The Min number of stores per population = 2,012.0 </a:t>
+            </a:r>
+          </a:p>
+          <a:p>
+            <a:pPr marL="285750" indent="-285750">
+              <a:buFont typeface="Wingdings" pitchFamily="2" charset="2"/>
+              <a:buChar char="Ø"/>
+            </a:pPr>
+            <a:r>
+              <a:rPr lang="en-US" sz="1400" dirty="0">
+                <a:solidFill>
+                  <a:schemeClr val="bg1"/>
+                </a:solidFill>
+              </a:rPr>
+              <a:t>The Avg number of stores per population = 22,240.0 </a:t>
+            </a:r>
+          </a:p>
+          <a:p>
+            <a:pPr marL="285750" indent="-285750">
+              <a:buFont typeface="Wingdings" pitchFamily="2" charset="2"/>
+              <a:buChar char="Ø"/>
+            </a:pPr>
+            <a:r>
+              <a:rPr lang="en-US" sz="1400" dirty="0">
+                <a:solidFill>
+                  <a:schemeClr val="bg1"/>
+                </a:solidFill>
+              </a:rPr>
+              <a:t>The Standard deviation number of stores per population = 18,130.0</a:t>
+            </a:r>
+          </a:p>
+        </p:txBody>
+      </p:sp>
+    </p:spTree>
+    <p:extLst>
+      <p:ext uri="{BB962C8B-B14F-4D97-AF65-F5344CB8AC3E}">
+        <p14:creationId xmlns:p14="http://schemas.microsoft.com/office/powerpoint/2010/main" val="739014723"/>
       </p:ext>
     </p:extLst>
   </p:cSld>

</xml_diff>